<commit_message>
Created by git commit on 2023-10-25 14:56:23
</commit_message>
<xml_diff>
--- a/examples/mcp/filesystem_example/sample_files/microsoft_culture.pptx
+++ b/examples/mcp/filesystem_example/sample_files/microsoft_culture.pptx
@@ -3108,7 +3108,7 @@
           <a:lstStyle/>
           <a:p>
             <a:r>
-              <a:t>企業文化介紹</a:t>
+              <a:t>微軟企業文化 - 第一頁</a:t>
             </a:r>
           </a:p>
         </p:txBody>
@@ -3129,27 +3129,27 @@
           <a:lstStyle/>
           <a:p>
             <a:r>
-              <a:t>微軟是一家以人為本的公司，重視全球影響力。</a:t>
-            </a:r>
-          </a:p>
-          <a:p>
-            <a:r>
-              <a:t>我們追求卓越，並以誠信為本。</a:t>
-            </a:r>
-          </a:p>
-          <a:p>
-            <a:r>
-              <a:t>以創新技術改變世界是我們的使命。</a:t>
-            </a:r>
-          </a:p>
-          <a:p>
-            <a:r>
-              <a:t>我們相信團隊合作，攜手成就非凡。</a:t>
-            </a:r>
-          </a:p>
-          <a:p>
-            <a:r>
-              <a:t>微軟致力於促進包容與多元文化。</a:t>
+              <a:t>• 微軟致力於透過科技引領全球進步。</a:t>
+            </a:r>
+          </a:p>
+          <a:p>
+            <a:r>
+              <a:t>• 我們的核心價值強調包容及多樣性。</a:t>
+            </a:r>
+          </a:p>
+          <a:p>
+            <a:r>
+              <a:t>• 社會責任是企業文化的基石。</a:t>
+            </a:r>
+          </a:p>
+          <a:p>
+            <a:r>
+              <a:t>• 與客戶和合作伙伴密切協作是我們的理念。</a:t>
+            </a:r>
+          </a:p>
+          <a:p>
+            <a:r>
+              <a:t>• 微軟支持創新，並鼓勵大膽嘗試。</a:t>
             </a:r>
           </a:p>
         </p:txBody>
@@ -3188,7 +3188,7 @@
           <a:lstStyle/>
           <a:p>
             <a:r>
-              <a:t>核心價值</a:t>
+              <a:t>微軟企業文化 - 第二頁</a:t>
             </a:r>
           </a:p>
         </p:txBody>
@@ -3209,27 +3209,27 @@
           <a:lstStyle/>
           <a:p>
             <a:r>
-              <a:t>微軟的核心價值是誠信、創新與服務。</a:t>
-            </a:r>
-          </a:p>
-          <a:p>
-            <a:r>
-              <a:t>我們以簡化科技賦能全球為目標。</a:t>
-            </a:r>
-          </a:p>
-          <a:p>
-            <a:r>
-              <a:t>誠信是企業成功的基石。</a:t>
-            </a:r>
-          </a:p>
-          <a:p>
-            <a:r>
-              <a:t>微軟倡導科技與人文結合。</a:t>
-            </a:r>
-          </a:p>
-          <a:p>
-            <a:r>
-              <a:t>核心價值促使我們不斷超越自我。</a:t>
+              <a:t>• 微軟的工作環境注重開放性與透明度。</a:t>
+            </a:r>
+          </a:p>
+          <a:p>
+            <a:r>
+              <a:t>• 員工享有彈性工作安排並支持遠端作業。</a:t>
+            </a:r>
+          </a:p>
+          <a:p>
+            <a:r>
+              <a:t>• 對技術的熱情是我們不斷前進的驅動力。</a:t>
+            </a:r>
+          </a:p>
+          <a:p>
+            <a:r>
+              <a:t>• 領導支持員工的成長與學習。</a:t>
+            </a:r>
+          </a:p>
+          <a:p>
+            <a:r>
+              <a:t>• 微軟追求卓越，並實現可持續性目標。</a:t>
             </a:r>
           </a:p>
         </p:txBody>
@@ -3268,7 +3268,7 @@
           <a:lstStyle/>
           <a:p>
             <a:r>
-              <a:t>創新精神</a:t>
+              <a:t>微軟企業文化 - 第三頁</a:t>
             </a:r>
           </a:p>
         </p:txBody>
@@ -3289,27 +3289,27 @@
           <a:lstStyle/>
           <a:p>
             <a:r>
-              <a:t>創新是微軟的基因所在。</a:t>
-            </a:r>
-          </a:p>
-          <a:p>
-            <a:r>
-              <a:t>我們致力於突破科技的邊界。</a:t>
-            </a:r>
-          </a:p>
-          <a:p>
-            <a:r>
-              <a:t>創新精神推動全球進步。</a:t>
-            </a:r>
-          </a:p>
-          <a:p>
-            <a:r>
-              <a:t>微軟為所有階層提供技術解決方案。</a:t>
-            </a:r>
-          </a:p>
-          <a:p>
-            <a:r>
-              <a:t>創造可持續未來是我們的使命。</a:t>
+              <a:t>• 微軟鼓勵員工參與創新項目。</a:t>
+            </a:r>
+          </a:p>
+          <a:p>
+            <a:r>
+              <a:t>• 我們的企業文化以信任為基礎。</a:t>
+            </a:r>
+          </a:p>
+          <a:p>
+            <a:r>
+              <a:t>• 顧客的成功是我們的成功。</a:t>
+            </a:r>
+          </a:p>
+          <a:p>
+            <a:r>
+              <a:t>• 微軟重視社群及環境影響。</a:t>
+            </a:r>
+          </a:p>
+          <a:p>
+            <a:r>
+              <a:t>• 推動技術教育以建立更好的未來。</a:t>
             </a:r>
           </a:p>
         </p:txBody>
@@ -3348,7 +3348,7 @@
           <a:lstStyle/>
           <a:p>
             <a:r>
-              <a:t>包容與多元</a:t>
+              <a:t>微軟企業文化 - 第四頁</a:t>
             </a:r>
           </a:p>
         </p:txBody>
@@ -3369,27 +3369,27 @@
           <a:lstStyle/>
           <a:p>
             <a:r>
-              <a:t>微軟重視包容性和多元性。</a:t>
-            </a:r>
-          </a:p>
-          <a:p>
-            <a:r>
-              <a:t>我們努力改變全球工作文化。</a:t>
-            </a:r>
-          </a:p>
-          <a:p>
-            <a:r>
-              <a:t>多元性是創意和創新的催化劑。</a:t>
-            </a:r>
-          </a:p>
-          <a:p>
-            <a:r>
-              <a:t>不分性別、種族，我們推動公平機會。</a:t>
-            </a:r>
-          </a:p>
-          <a:p>
-            <a:r>
-              <a:t>包容使團隊更具協作力。</a:t>
+              <a:t>• 微軟支持包容性，建立多元化的技術行業。</a:t>
+            </a:r>
+          </a:p>
+          <a:p>
+            <a:r>
+              <a:t>• 我們的產品是以用戶需求為中心設計的。</a:t>
+            </a:r>
+          </a:p>
+          <a:p>
+            <a:r>
+              <a:t>• 微軟關注環境保護並實現碳中和目標。</a:t>
+            </a:r>
+          </a:p>
+          <a:p>
+            <a:r>
+              <a:t>• 員工的健康與幸福是文化的一部分。</a:t>
+            </a:r>
+          </a:p>
+          <a:p>
+            <a:r>
+              <a:t>• 微軟的使命是賦能個人及機構創造更多成果。</a:t>
             </a:r>
           </a:p>
         </p:txBody>
@@ -3428,7 +3428,7 @@
           <a:lstStyle/>
           <a:p>
             <a:r>
-              <a:t>社會責任</a:t>
+              <a:t>微軟企業文化 - 第五頁</a:t>
             </a:r>
           </a:p>
         </p:txBody>
@@ -3449,27 +3449,27 @@
           <a:lstStyle/>
           <a:p>
             <a:r>
-              <a:t>微軟承諾對社會負責。</a:t>
-            </a:r>
-          </a:p>
-          <a:p>
-            <a:r>
-              <a:t>我們大力投資於教育和技能訓練。</a:t>
-            </a:r>
-          </a:p>
-          <a:p>
-            <a:r>
-              <a:t>促進環境可持續性是我們的第一要務。</a:t>
-            </a:r>
-          </a:p>
-          <a:p>
-            <a:r>
-              <a:t>微軟提高全球技術普及性。</a:t>
-            </a:r>
-          </a:p>
-          <a:p>
-            <a:r>
-              <a:t>通過慈善與公益項目，影響力不斷擴大。</a:t>
+              <a:t>• 微軟的品牌理念體現信任與可靠性。</a:t>
+            </a:r>
+          </a:p>
+          <a:p>
+            <a:r>
+              <a:t>• 我們鼓勵員工擁有創造性思維並挑戰自我。</a:t>
+            </a:r>
+          </a:p>
+          <a:p>
+            <a:r>
+              <a:t>• 微軟與非營利組織合作以提高社會影響力。</a:t>
+            </a:r>
+          </a:p>
+          <a:p>
+            <a:r>
+              <a:t>• 投資技術以幫助全球應對重要挑戰。</a:t>
+            </a:r>
+          </a:p>
+          <a:p>
+            <a:r>
+              <a:t>• 微軟致力於提供世界一流的解決方案。</a:t>
             </a:r>
           </a:p>
         </p:txBody>

</xml_diff>